<commit_message>
completed draft of week 4 with exercises
</commit_message>
<xml_diff>
--- a/practicaldatascience_materials/overview_figure/mids_coursera_overview_figure.pptx
+++ b/practicaldatascience_materials/overview_figure/mids_coursera_overview_figure.pptx
@@ -104,6 +104,11 @@
       </a:defRPr>
     </a:lvl9pPr>
   </p:defaultTextStyle>
+  <p:extLst>
+    <p:ext uri="{EFAFB233-063F-42B5-8137-9DF3F51BA10A}">
+      <p15:sldGuideLst xmlns:p15="http://schemas.microsoft.com/office/powerpoint/2012/main"/>
+    </p:ext>
+  </p:extLst>
 </p:presentation>
 </file>
 
@@ -238,7 +243,7 @@
           <a:p>
             <a:fld id="{171DB5DB-D1D7-5D47-9D50-66E5E6FBF8FF}" type="datetimeFigureOut">
               <a:rPr lang="en-US" smtClean="0"/>
-              <a:t>12/2/21</a:t>
+              <a:t>12/10/21</a:t>
             </a:fld>
             <a:endParaRPr lang="en-US"/>
           </a:p>
@@ -408,7 +413,7 @@
           <a:p>
             <a:fld id="{171DB5DB-D1D7-5D47-9D50-66E5E6FBF8FF}" type="datetimeFigureOut">
               <a:rPr lang="en-US" smtClean="0"/>
-              <a:t>12/2/21</a:t>
+              <a:t>12/10/21</a:t>
             </a:fld>
             <a:endParaRPr lang="en-US"/>
           </a:p>
@@ -588,7 +593,7 @@
           <a:p>
             <a:fld id="{171DB5DB-D1D7-5D47-9D50-66E5E6FBF8FF}" type="datetimeFigureOut">
               <a:rPr lang="en-US" smtClean="0"/>
-              <a:t>12/2/21</a:t>
+              <a:t>12/10/21</a:t>
             </a:fld>
             <a:endParaRPr lang="en-US"/>
           </a:p>
@@ -758,7 +763,7 @@
           <a:p>
             <a:fld id="{171DB5DB-D1D7-5D47-9D50-66E5E6FBF8FF}" type="datetimeFigureOut">
               <a:rPr lang="en-US" smtClean="0"/>
-              <a:t>12/2/21</a:t>
+              <a:t>12/10/21</a:t>
             </a:fld>
             <a:endParaRPr lang="en-US"/>
           </a:p>
@@ -1004,7 +1009,7 @@
           <a:p>
             <a:fld id="{171DB5DB-D1D7-5D47-9D50-66E5E6FBF8FF}" type="datetimeFigureOut">
               <a:rPr lang="en-US" smtClean="0"/>
-              <a:t>12/2/21</a:t>
+              <a:t>12/10/21</a:t>
             </a:fld>
             <a:endParaRPr lang="en-US"/>
           </a:p>
@@ -1236,7 +1241,7 @@
           <a:p>
             <a:fld id="{171DB5DB-D1D7-5D47-9D50-66E5E6FBF8FF}" type="datetimeFigureOut">
               <a:rPr lang="en-US" smtClean="0"/>
-              <a:t>12/2/21</a:t>
+              <a:t>12/10/21</a:t>
             </a:fld>
             <a:endParaRPr lang="en-US"/>
           </a:p>
@@ -1603,7 +1608,7 @@
           <a:p>
             <a:fld id="{171DB5DB-D1D7-5D47-9D50-66E5E6FBF8FF}" type="datetimeFigureOut">
               <a:rPr lang="en-US" smtClean="0"/>
-              <a:t>12/2/21</a:t>
+              <a:t>12/10/21</a:t>
             </a:fld>
             <a:endParaRPr lang="en-US"/>
           </a:p>
@@ -1721,7 +1726,7 @@
           <a:p>
             <a:fld id="{171DB5DB-D1D7-5D47-9D50-66E5E6FBF8FF}" type="datetimeFigureOut">
               <a:rPr lang="en-US" smtClean="0"/>
-              <a:t>12/2/21</a:t>
+              <a:t>12/10/21</a:t>
             </a:fld>
             <a:endParaRPr lang="en-US"/>
           </a:p>
@@ -1816,7 +1821,7 @@
           <a:p>
             <a:fld id="{171DB5DB-D1D7-5D47-9D50-66E5E6FBF8FF}" type="datetimeFigureOut">
               <a:rPr lang="en-US" smtClean="0"/>
-              <a:t>12/2/21</a:t>
+              <a:t>12/10/21</a:t>
             </a:fld>
             <a:endParaRPr lang="en-US"/>
           </a:p>
@@ -2093,7 +2098,7 @@
           <a:p>
             <a:fld id="{171DB5DB-D1D7-5D47-9D50-66E5E6FBF8FF}" type="datetimeFigureOut">
               <a:rPr lang="en-US" smtClean="0"/>
-              <a:t>12/2/21</a:t>
+              <a:t>12/10/21</a:t>
             </a:fld>
             <a:endParaRPr lang="en-US"/>
           </a:p>
@@ -2350,7 +2355,7 @@
           <a:p>
             <a:fld id="{171DB5DB-D1D7-5D47-9D50-66E5E6FBF8FF}" type="datetimeFigureOut">
               <a:rPr lang="en-US" smtClean="0"/>
-              <a:t>12/2/21</a:t>
+              <a:t>12/10/21</a:t>
             </a:fld>
             <a:endParaRPr lang="en-US"/>
           </a:p>
@@ -2563,7 +2568,7 @@
           <a:p>
             <a:fld id="{171DB5DB-D1D7-5D47-9D50-66E5E6FBF8FF}" type="datetimeFigureOut">
               <a:rPr lang="en-US" smtClean="0"/>
-              <a:t>12/2/21</a:t>
+              <a:t>12/10/21</a:t>
             </a:fld>
             <a:endParaRPr lang="en-US"/>
           </a:p>
@@ -2968,6 +2973,53 @@
           <a:chExt cx="0" cy="0"/>
         </a:xfrm>
       </p:grpSpPr>
+      <p:cxnSp>
+        <p:nvCxnSpPr>
+          <p:cNvPr id="3" name="Straight Arrow Connector 2">
+            <a:extLst>
+              <a:ext uri="{FF2B5EF4-FFF2-40B4-BE49-F238E27FC236}">
+                <a16:creationId xmlns:a16="http://schemas.microsoft.com/office/drawing/2014/main" id="{E749AA32-6531-AA4F-B784-C81A146CF1A2}"/>
+              </a:ext>
+            </a:extLst>
+          </p:cNvPr>
+          <p:cNvCxnSpPr>
+            <a:cxnSpLocks/>
+          </p:cNvCxnSpPr>
+          <p:nvPr/>
+        </p:nvCxnSpPr>
+        <p:spPr>
+          <a:xfrm flipV="1">
+            <a:off x="2032000" y="1404987"/>
+            <a:ext cx="9567333" cy="5029680"/>
+          </a:xfrm>
+          <a:prstGeom prst="straightConnector1">
+            <a:avLst/>
+          </a:prstGeom>
+          <a:ln w="396875" cap="rnd">
+            <a:solidFill>
+              <a:schemeClr val="bg1">
+                <a:lumMod val="50000"/>
+                <a:alpha val="10004"/>
+              </a:schemeClr>
+            </a:solidFill>
+            <a:tailEnd type="triangle"/>
+          </a:ln>
+        </p:spPr>
+        <p:style>
+          <a:lnRef idx="1">
+            <a:schemeClr val="accent1"/>
+          </a:lnRef>
+          <a:fillRef idx="0">
+            <a:schemeClr val="accent1"/>
+          </a:fillRef>
+          <a:effectRef idx="0">
+            <a:schemeClr val="accent1"/>
+          </a:effectRef>
+          <a:fontRef idx="minor">
+            <a:schemeClr val="tx1"/>
+          </a:fontRef>
+        </p:style>
+      </p:cxnSp>
       <p:sp>
         <p:nvSpPr>
           <p:cNvPr id="6" name="Rectangle 5">
@@ -3254,7 +3306,7 @@
               <a:buChar char="•"/>
             </a:pPr>
             <a:r>
-              <a:rPr lang="en-US" sz="1100" dirty="0">
+              <a:rPr lang="en-US" sz="1100">
                 <a:solidFill>
                   <a:schemeClr val="tx1">
                     <a:lumMod val="50000"/>
@@ -3262,45 +3314,8 @@
                   </a:schemeClr>
                 </a:solidFill>
               </a:rPr>
-              <a:t>Vectorization</a:t>
-            </a:r>
-          </a:p>
-          <a:p>
-            <a:pPr marL="285750" indent="-285750">
-              <a:buFont typeface="Arial" panose="020B0604020202020204" pitchFamily="34" charset="0"/>
-              <a:buChar char="•"/>
-            </a:pPr>
-            <a:r>
-              <a:rPr lang="en-US" sz="1100" dirty="0">
-                <a:solidFill>
-                  <a:schemeClr val="tx1">
-                    <a:lumMod val="50000"/>
-                    <a:lumOff val="50000"/>
-                  </a:schemeClr>
-                </a:solidFill>
-              </a:rPr>
               <a:t>Matrices</a:t>
             </a:r>
-          </a:p>
-          <a:p>
-            <a:pPr marL="285750" indent="-285750">
-              <a:buFont typeface="Arial" panose="020B0604020202020204" pitchFamily="34" charset="0"/>
-              <a:buChar char="•"/>
-            </a:pPr>
-            <a:r>
-              <a:rPr lang="en-US" sz="1100" dirty="0">
-                <a:solidFill>
-                  <a:schemeClr val="tx1">
-                    <a:lumMod val="50000"/>
-                    <a:lumOff val="50000"/>
-                  </a:schemeClr>
-                </a:solidFill>
-              </a:rPr>
-              <a:t>Randomization</a:t>
-            </a:r>
-          </a:p>
-          <a:p>
-            <a:pPr algn="ctr"/>
             <a:endParaRPr lang="en-US" sz="1400" dirty="0">
               <a:solidFill>
                 <a:sysClr val="windowText" lastClr="000000"/>
@@ -4467,6 +4482,32 @@
                 </a:solidFill>
               </a:rPr>
               <a:t>Object oriented programming</a:t>
+            </a:r>
+          </a:p>
+          <a:p>
+            <a:r>
+              <a:rPr lang="en-US" sz="1100" dirty="0">
+                <a:solidFill>
+                  <a:schemeClr val="tx1">
+                    <a:lumMod val="50000"/>
+                    <a:lumOff val="50000"/>
+                  </a:schemeClr>
+                </a:solidFill>
+              </a:rPr>
+              <a:t>Vectorization</a:t>
+            </a:r>
+          </a:p>
+          <a:p>
+            <a:r>
+              <a:rPr lang="en-US" sz="1100" dirty="0">
+                <a:solidFill>
+                  <a:schemeClr val="tx1">
+                    <a:lumMod val="50000"/>
+                    <a:lumOff val="50000"/>
+                  </a:schemeClr>
+                </a:solidFill>
+              </a:rPr>
+              <a:t>Randomization</a:t>
             </a:r>
           </a:p>
         </p:txBody>

</xml_diff>